<commit_message>
Added Sanket's presentation notes
Added notes on Sanket's presentation slides
</commit_message>
<xml_diff>
--- a/Keras Stock Predictor.pptx
+++ b/Keras Stock Predictor.pptx
@@ -2310,7 +2310,8 @@
               <a:buNone/>
             </a:pPr>
             <a:r>
-              <a:t/>
+              <a:rPr lang="en-US"/>
+              <a:t>When looking at the Stock Market overall instead of individual stocks, predicting the close values accurately for the entire market is much more complicated and difficult to predict. When we used the 30 day window, 5 day future point, it still varied greatly between individual stocks. The red line here signifies the  One limitation of using ML to predict stocks is that the model isn’t able to forecast factors that could affect the market itself. Additionally, as you predict close values further ahead in the future, you start to lose accuracy.  </a:t>
             </a:r>
             <a:endParaRPr/>
           </a:p>
@@ -2937,7 +2938,8 @@
               <a:buNone/>
             </a:pPr>
             <a:r>
-              <a:t/>
+              <a:rPr lang="en-US"/>
+              <a:t>The first model we created was the Moving Average Model. This model looks only at the close values. It takes all the close train values and averages them. It uses this average to predict the first prediction point. That first predicted point is then added back into the average and the new average is used to predict the second point and so on. As you can probably assume, this model was not very efficient at predicting the test values.</a:t>
             </a:r>
             <a:endParaRPr/>
           </a:p>
@@ -3080,7 +3082,8 @@
               <a:buNone/>
             </a:pPr>
             <a:r>
-              <a:t/>
+              <a:rPr lang="en-US"/>
+              <a:t>The next model we used was the K-Nearest Neighbors Model. As we talked about in class, the KNN Model looks at the n closest values to it to determine the trend line. This model was crossvalidated and passed odd-value neighbor parameters of 3,5,7, and 9. The KNN model then chooses the parameter that best fits the data. As you can see, the predict line is more accurate that the Moving Average but still varies from the actual close.</a:t>
             </a:r>
             <a:endParaRPr/>
           </a:p>
@@ -3366,7 +3369,8 @@
               <a:buNone/>
             </a:pPr>
             <a:r>
-              <a:t/>
+              <a:rPr lang="en-US"/>
+              <a:t>Unfortunately, even the best fit parameters of p,q, and d were terrible at predicting the actual close values.</a:t>
             </a:r>
             <a:endParaRPr/>
           </a:p>
@@ -14697,7 +14701,7 @@
         </p:blipFill>
         <p:spPr>
           <a:xfrm>
-            <a:off x="22256" y="2989375"/>
+            <a:off x="98456" y="2989375"/>
             <a:ext cx="6009999" cy="3772700"/>
           </a:xfrm>
           <a:prstGeom prst="rect">
@@ -14893,7 +14897,7 @@
             </a:pPr>
             <a:r>
               <a:rPr b="1" lang="en-US"/>
-              <a:t>Mission: Predict Stock Market trends over the span of 6 months based on 2 years worth of stock data</a:t>
+              <a:t>Mission: Predict Stock Market trends over the span of 6 months based on 2 and a half years worth of stock data</a:t>
             </a:r>
             <a:endParaRPr/>
           </a:p>
@@ -14950,7 +14954,7 @@
             </a:pPr>
             <a:r>
               <a:rPr b="1" lang="en-US"/>
-              <a:t>Vision: Visualize a graph that shows the profitability of each stock included in our dataset by analyzing the close price of a stock over the span of 2 years</a:t>
+              <a:t>Vision: Visualize a graph that shows the profitability of each stock included in our dataset by analyzing the close price of a stock over the span of 2 and a half years</a:t>
             </a:r>
             <a:endParaRPr/>
           </a:p>

</xml_diff>